<commit_message>
Added english screenshots to basketball assignment
</commit_message>
<xml_diff>
--- a/scratch-leapmotion/instructions/en/Basketball.pptx
+++ b/scratch-leapmotion/instructions/en/Basketball.pptx
@@ -4177,14 +4177,7 @@
           <a:p>
             <a:r>
               <a:rPr lang="nl-NL" dirty="0" smtClean="0"/>
-              <a:t>Programmeren</a:t>
-            </a:r>
-            <a:br>
-              <a:rPr lang="nl-NL" dirty="0" smtClean="0"/>
-            </a:br>
-            <a:r>
-              <a:rPr lang="nl-NL" dirty="0" smtClean="0"/>
-              <a:t>Basketbal</a:t>
+              <a:t>Move the basketball</a:t>
             </a:r>
             <a:endParaRPr lang="nl-NL" dirty="0"/>
           </a:p>
@@ -5774,26 +5767,34 @@
       </p:grpSpPr>
       <p:pic>
         <p:nvPicPr>
-          <p:cNvPr id="3" name="Picture 2"/>
+          <p:cNvPr id="1027" name="Picture 3"/>
           <p:cNvPicPr>
-            <a:picLocks noChangeAspect="1"/>
+            <a:picLocks noChangeAspect="1" noChangeArrowheads="1"/>
           </p:cNvPicPr>
           <p:nvPr/>
         </p:nvPicPr>
         <p:blipFill>
           <a:blip r:embed="rId2"/>
+          <a:srcRect/>
           <a:stretch>
             <a:fillRect/>
           </a:stretch>
         </p:blipFill>
-        <p:spPr>
+        <p:spPr bwMode="auto">
           <a:xfrm>
-            <a:off x="4484324" y="2030759"/>
-            <a:ext cx="4465345" cy="2672175"/>
+            <a:off x="4391025" y="2030759"/>
+            <a:ext cx="4752975" cy="2428875"/>
           </a:xfrm>
           <a:prstGeom prst="rect">
             <a:avLst/>
           </a:prstGeom>
+          <a:noFill/>
+          <a:ln w="9525">
+            <a:noFill/>
+            <a:miter lim="800000"/>
+            <a:headEnd/>
+            <a:tailEnd/>
+          </a:ln>
         </p:spPr>
       </p:pic>
       <p:sp>
@@ -6324,7 +6325,7 @@
         </p:nvSpPr>
         <p:spPr>
           <a:xfrm>
-            <a:off x="4648301" y="3580602"/>
+            <a:off x="4444446" y="3310932"/>
             <a:ext cx="4217508" cy="834772"/>
           </a:xfrm>
           <a:prstGeom prst="roundRect">
@@ -6399,26 +6400,34 @@
       </p:grpSpPr>
       <p:pic>
         <p:nvPicPr>
-          <p:cNvPr id="3" name="Picture 2"/>
+          <p:cNvPr id="2050" name="Picture 2"/>
           <p:cNvPicPr>
-            <a:picLocks noChangeAspect="1"/>
+            <a:picLocks noChangeAspect="1" noChangeArrowheads="1"/>
           </p:cNvPicPr>
           <p:nvPr/>
         </p:nvPicPr>
         <p:blipFill>
           <a:blip r:embed="rId2"/>
+          <a:srcRect/>
           <a:stretch>
             <a:fillRect/>
           </a:stretch>
         </p:blipFill>
-        <p:spPr>
+        <p:spPr bwMode="auto">
           <a:xfrm>
-            <a:off x="4258716" y="1880947"/>
-            <a:ext cx="4726534" cy="2887752"/>
+            <a:off x="4408004" y="1889472"/>
+            <a:ext cx="4638675" cy="2638425"/>
           </a:xfrm>
           <a:prstGeom prst="rect">
             <a:avLst/>
           </a:prstGeom>
+          <a:noFill/>
+          <a:ln w="9525">
+            <a:noFill/>
+            <a:miter lim="800000"/>
+            <a:headEnd/>
+            <a:tailEnd/>
+          </a:ln>
         </p:spPr>
       </p:pic>
       <p:sp>
@@ -7152,8 +7161,8 @@
         </p:nvSpPr>
         <p:spPr>
           <a:xfrm>
-            <a:off x="4648300" y="3784233"/>
-            <a:ext cx="2947240" cy="613035"/>
+            <a:off x="4648300" y="3441560"/>
+            <a:ext cx="2947240" cy="366765"/>
           </a:xfrm>
           <a:prstGeom prst="roundRect">
             <a:avLst/>
@@ -7461,11 +7470,11 @@
           <a:p>
             <a:pPr algn="l"/>
             <a:r>
-              <a:rPr lang="en-US" dirty="0" err="1" smtClean="0">
-                <a:latin typeface="Comic Sans MS"/>
-                <a:cs typeface="Comic Sans MS"/>
-              </a:rPr>
-              <a:t>Basketbal</a:t>
+              <a:rPr lang="en-US" dirty="0" smtClean="0">
+                <a:latin typeface="Comic Sans MS"/>
+                <a:cs typeface="Comic Sans MS"/>
+              </a:rPr>
+              <a:t>Basketball</a:t>
             </a:r>
             <a:endParaRPr lang="en-US" dirty="0">
               <a:latin typeface="Comic Sans MS"/>
@@ -8267,8 +8276,8 @@
         </p:nvSpPr>
         <p:spPr>
           <a:xfrm>
-            <a:off x="4648300" y="3683362"/>
-            <a:ext cx="2252380" cy="941545"/>
+            <a:off x="4648300" y="3798278"/>
+            <a:ext cx="2252380" cy="643094"/>
           </a:xfrm>
           <a:prstGeom prst="roundRect">
             <a:avLst/>
@@ -8504,26 +8513,34 @@
       </p:grpSpPr>
       <p:pic>
         <p:nvPicPr>
-          <p:cNvPr id="8" name="Picture 7"/>
+          <p:cNvPr id="4098" name="Picture 2"/>
           <p:cNvPicPr>
-            <a:picLocks noChangeAspect="1"/>
+            <a:picLocks noChangeAspect="1" noChangeArrowheads="1"/>
           </p:cNvPicPr>
           <p:nvPr/>
         </p:nvPicPr>
         <p:blipFill>
           <a:blip r:embed="rId2"/>
+          <a:srcRect/>
           <a:stretch>
             <a:fillRect/>
           </a:stretch>
         </p:blipFill>
-        <p:spPr>
+        <p:spPr bwMode="auto">
           <a:xfrm>
-            <a:off x="4504611" y="1605541"/>
-            <a:ext cx="4448043" cy="3910618"/>
+            <a:off x="4257675" y="1912276"/>
+            <a:ext cx="4886325" cy="3495675"/>
           </a:xfrm>
           <a:prstGeom prst="rect">
             <a:avLst/>
           </a:prstGeom>
+          <a:noFill/>
+          <a:ln w="9525">
+            <a:noFill/>
+            <a:miter lim="800000"/>
+            <a:headEnd/>
+            <a:tailEnd/>
+          </a:ln>
         </p:spPr>
       </p:pic>
       <p:sp>
@@ -8548,11 +8565,11 @@
           <a:p>
             <a:pPr algn="l"/>
             <a:r>
-              <a:rPr lang="en-US" dirty="0" err="1" smtClean="0">
-                <a:latin typeface="Comic Sans MS"/>
-                <a:cs typeface="Comic Sans MS"/>
-              </a:rPr>
-              <a:t>Basketbal</a:t>
+              <a:rPr lang="en-US" dirty="0" smtClean="0">
+                <a:latin typeface="Comic Sans MS"/>
+                <a:cs typeface="Comic Sans MS"/>
+              </a:rPr>
+              <a:t>Basketball</a:t>
             </a:r>
             <a:endParaRPr lang="en-US" dirty="0">
               <a:latin typeface="Comic Sans MS"/>
@@ -9347,8 +9364,8 @@
         </p:nvSpPr>
         <p:spPr>
           <a:xfrm>
-            <a:off x="4926492" y="4265469"/>
-            <a:ext cx="1938248" cy="694936"/>
+            <a:off x="4715477" y="4180114"/>
+            <a:ext cx="1655178" cy="457200"/>
           </a:xfrm>
           <a:prstGeom prst="roundRect">
             <a:avLst/>
@@ -9486,26 +9503,34 @@
       </p:grpSpPr>
       <p:pic>
         <p:nvPicPr>
-          <p:cNvPr id="3" name="Picture 2"/>
+          <p:cNvPr id="5122" name="Picture 2"/>
           <p:cNvPicPr>
-            <a:picLocks noChangeAspect="1"/>
+            <a:picLocks noChangeAspect="1" noChangeArrowheads="1"/>
           </p:cNvPicPr>
           <p:nvPr/>
         </p:nvPicPr>
         <p:blipFill>
           <a:blip r:embed="rId2"/>
+          <a:srcRect/>
           <a:stretch>
             <a:fillRect/>
           </a:stretch>
         </p:blipFill>
-        <p:spPr>
+        <p:spPr bwMode="auto">
           <a:xfrm>
-            <a:off x="4326488" y="1619416"/>
-            <a:ext cx="4793476" cy="2831762"/>
+            <a:off x="4162216" y="1250275"/>
+            <a:ext cx="4886325" cy="3495675"/>
           </a:xfrm>
           <a:prstGeom prst="rect">
             <a:avLst/>
           </a:prstGeom>
+          <a:noFill/>
+          <a:ln w="9525">
+            <a:noFill/>
+            <a:miter lim="800000"/>
+            <a:headEnd/>
+            <a:tailEnd/>
+          </a:ln>
         </p:spPr>
       </p:pic>
       <p:sp>
@@ -9530,11 +9555,11 @@
           <a:p>
             <a:pPr algn="l"/>
             <a:r>
-              <a:rPr lang="en-US" dirty="0" err="1" smtClean="0">
-                <a:latin typeface="Comic Sans MS"/>
-                <a:cs typeface="Comic Sans MS"/>
-              </a:rPr>
-              <a:t>Basketbal</a:t>
+              <a:rPr lang="en-US" dirty="0" smtClean="0">
+                <a:latin typeface="Comic Sans MS"/>
+                <a:cs typeface="Comic Sans MS"/>
+              </a:rPr>
+              <a:t>Basketball</a:t>
             </a:r>
             <a:endParaRPr lang="en-US" dirty="0">
               <a:latin typeface="Comic Sans MS"/>
@@ -10112,21 +10137,7 @@
                 <a:latin typeface="Comic Sans MS"/>
                 <a:cs typeface="Comic Sans MS"/>
               </a:rPr>
-              <a:t> a </a:t>
-            </a:r>
-            <a:r>
-              <a:rPr lang="nl-NL" err="1" smtClean="0">
-                <a:latin typeface="Comic Sans MS"/>
-                <a:cs typeface="Comic Sans MS"/>
-              </a:rPr>
-              <a:t>score</a:t>
-            </a:r>
-            <a:r>
-              <a:rPr lang="nl-NL" smtClean="0">
-                <a:latin typeface="Comic Sans MS"/>
-                <a:cs typeface="Comic Sans MS"/>
-              </a:rPr>
-              <a:t>.</a:t>
+              <a:t> a score.</a:t>
             </a:r>
             <a:endParaRPr lang="nl-NL" dirty="0">
               <a:latin typeface="Comic Sans MS"/>
@@ -10144,7 +10155,7 @@
         <p:spPr>
           <a:xfrm>
             <a:off x="4648298" y="3720296"/>
-            <a:ext cx="4471665" cy="365448"/>
+            <a:ext cx="4217511" cy="304069"/>
           </a:xfrm>
           <a:prstGeom prst="roundRect">
             <a:avLst/>

</xml_diff>